<commit_message>
PArameters space change and matching with the simulation
</commit_message>
<xml_diff>
--- a/Documentation/Parameters space.pptx
+++ b/Documentation/Parameters space.pptx
@@ -104,6 +104,11 @@
       </a:defRPr>
     </a:lvl9pPr>
   </p:defaultTextStyle>
+  <p:extLst>
+    <p:ext uri="{EFAFB233-063F-42B5-8137-9DF3F51BA10A}">
+      <p15:sldGuideLst xmlns:p15="http://schemas.microsoft.com/office/powerpoint/2012/main"/>
+    </p:ext>
+  </p:extLst>
 </p:presentation>
 </file>
 
@@ -238,7 +243,7 @@
           <a:p>
             <a:fld id="{82230ED6-5AAA-0A4A-9B1D-EC2D861041EB}" type="datetimeFigureOut">
               <a:rPr lang="en-US" smtClean="0"/>
-              <a:t>8/5/16</a:t>
+              <a:t>8/8/16</a:t>
             </a:fld>
             <a:endParaRPr lang="en-US"/>
           </a:p>
@@ -408,7 +413,7 @@
           <a:p>
             <a:fld id="{82230ED6-5AAA-0A4A-9B1D-EC2D861041EB}" type="datetimeFigureOut">
               <a:rPr lang="en-US" smtClean="0"/>
-              <a:t>8/5/16</a:t>
+              <a:t>8/8/16</a:t>
             </a:fld>
             <a:endParaRPr lang="en-US"/>
           </a:p>
@@ -588,7 +593,7 @@
           <a:p>
             <a:fld id="{82230ED6-5AAA-0A4A-9B1D-EC2D861041EB}" type="datetimeFigureOut">
               <a:rPr lang="en-US" smtClean="0"/>
-              <a:t>8/5/16</a:t>
+              <a:t>8/8/16</a:t>
             </a:fld>
             <a:endParaRPr lang="en-US"/>
           </a:p>
@@ -758,7 +763,7 @@
           <a:p>
             <a:fld id="{82230ED6-5AAA-0A4A-9B1D-EC2D861041EB}" type="datetimeFigureOut">
               <a:rPr lang="en-US" smtClean="0"/>
-              <a:t>8/5/16</a:t>
+              <a:t>8/8/16</a:t>
             </a:fld>
             <a:endParaRPr lang="en-US"/>
           </a:p>
@@ -1004,7 +1009,7 @@
           <a:p>
             <a:fld id="{82230ED6-5AAA-0A4A-9B1D-EC2D861041EB}" type="datetimeFigureOut">
               <a:rPr lang="en-US" smtClean="0"/>
-              <a:t>8/5/16</a:t>
+              <a:t>8/8/16</a:t>
             </a:fld>
             <a:endParaRPr lang="en-US"/>
           </a:p>
@@ -1236,7 +1241,7 @@
           <a:p>
             <a:fld id="{82230ED6-5AAA-0A4A-9B1D-EC2D861041EB}" type="datetimeFigureOut">
               <a:rPr lang="en-US" smtClean="0"/>
-              <a:t>8/5/16</a:t>
+              <a:t>8/8/16</a:t>
             </a:fld>
             <a:endParaRPr lang="en-US"/>
           </a:p>
@@ -1603,7 +1608,7 @@
           <a:p>
             <a:fld id="{82230ED6-5AAA-0A4A-9B1D-EC2D861041EB}" type="datetimeFigureOut">
               <a:rPr lang="en-US" smtClean="0"/>
-              <a:t>8/5/16</a:t>
+              <a:t>8/8/16</a:t>
             </a:fld>
             <a:endParaRPr lang="en-US"/>
           </a:p>
@@ -1721,7 +1726,7 @@
           <a:p>
             <a:fld id="{82230ED6-5AAA-0A4A-9B1D-EC2D861041EB}" type="datetimeFigureOut">
               <a:rPr lang="en-US" smtClean="0"/>
-              <a:t>8/5/16</a:t>
+              <a:t>8/8/16</a:t>
             </a:fld>
             <a:endParaRPr lang="en-US"/>
           </a:p>
@@ -1816,7 +1821,7 @@
           <a:p>
             <a:fld id="{82230ED6-5AAA-0A4A-9B1D-EC2D861041EB}" type="datetimeFigureOut">
               <a:rPr lang="en-US" smtClean="0"/>
-              <a:t>8/5/16</a:t>
+              <a:t>8/8/16</a:t>
             </a:fld>
             <a:endParaRPr lang="en-US"/>
           </a:p>
@@ -2093,7 +2098,7 @@
           <a:p>
             <a:fld id="{82230ED6-5AAA-0A4A-9B1D-EC2D861041EB}" type="datetimeFigureOut">
               <a:rPr lang="en-US" smtClean="0"/>
-              <a:t>8/5/16</a:t>
+              <a:t>8/8/16</a:t>
             </a:fld>
             <a:endParaRPr lang="en-US"/>
           </a:p>
@@ -2350,7 +2355,7 @@
           <a:p>
             <a:fld id="{82230ED6-5AAA-0A4A-9B1D-EC2D861041EB}" type="datetimeFigureOut">
               <a:rPr lang="en-US" smtClean="0"/>
-              <a:t>8/5/16</a:t>
+              <a:t>8/8/16</a:t>
             </a:fld>
             <a:endParaRPr lang="en-US"/>
           </a:p>
@@ -2563,7 +2568,7 @@
           <a:p>
             <a:fld id="{82230ED6-5AAA-0A4A-9B1D-EC2D861041EB}" type="datetimeFigureOut">
               <a:rPr lang="en-US" smtClean="0"/>
-              <a:t>8/5/16</a:t>
+              <a:t>8/8/16</a:t>
             </a:fld>
             <a:endParaRPr lang="en-US"/>
           </a:p>
@@ -2970,14 +2975,14 @@
       </p:grpSpPr>
       <p:sp>
         <p:nvSpPr>
-          <p:cNvPr id="149" name="TextBox 148"/>
+          <p:cNvPr id="168" name="TextBox 167"/>
           <p:cNvSpPr txBox="1"/>
           <p:nvPr/>
         </p:nvSpPr>
         <p:spPr>
           <a:xfrm>
-            <a:off x="5037700" y="5148807"/>
-            <a:ext cx="338554" cy="461793"/>
+            <a:off x="5061624" y="5431542"/>
+            <a:ext cx="309700" cy="584904"/>
           </a:xfrm>
           <a:prstGeom prst="rect">
             <a:avLst/>
@@ -2991,10 +2996,70 @@
           <a:lstStyle/>
           <a:p>
             <a:r>
-              <a:rPr lang="en-US" sz="2401"/>
+              <a:rPr lang="en-US" sz="3201" dirty="0"/>
+              <a:t>-</a:t>
+            </a:r>
+            <a:endParaRPr lang="en-US" sz="2000" dirty="0"/>
+          </a:p>
+        </p:txBody>
+      </p:sp>
+      <p:sp>
+        <p:nvSpPr>
+          <p:cNvPr id="141" name="TextBox 140"/>
+          <p:cNvSpPr txBox="1"/>
+          <p:nvPr/>
+        </p:nvSpPr>
+        <p:spPr>
+          <a:xfrm>
+            <a:off x="5394942" y="4349799"/>
+            <a:ext cx="309700" cy="584904"/>
+          </a:xfrm>
+          <a:prstGeom prst="rect">
+            <a:avLst/>
+          </a:prstGeom>
+          <a:noFill/>
+        </p:spPr>
+        <p:txBody>
+          <a:bodyPr wrap="none" rtlCol="0">
+            <a:spAutoFit/>
+          </a:bodyPr>
+          <a:lstStyle/>
+          <a:p>
+            <a:r>
+              <a:rPr lang="en-US" sz="3201" dirty="0"/>
+              <a:t>-</a:t>
+            </a:r>
+            <a:endParaRPr lang="en-US" sz="2000" dirty="0"/>
+          </a:p>
+        </p:txBody>
+      </p:sp>
+      <p:sp>
+        <p:nvSpPr>
+          <p:cNvPr id="149" name="TextBox 148"/>
+          <p:cNvSpPr txBox="1"/>
+          <p:nvPr/>
+        </p:nvSpPr>
+        <p:spPr>
+          <a:xfrm>
+            <a:off x="5037700" y="5148807"/>
+            <a:ext cx="312906" cy="400110"/>
+          </a:xfrm>
+          <a:prstGeom prst="rect">
+            <a:avLst/>
+          </a:prstGeom>
+          <a:noFill/>
+        </p:spPr>
+        <p:txBody>
+          <a:bodyPr wrap="none" rtlCol="0">
+            <a:spAutoFit/>
+          </a:bodyPr>
+          <a:lstStyle/>
+          <a:p>
+            <a:r>
+              <a:rPr lang="en-US" sz="2000" dirty="0"/>
               <a:t>+</a:t>
             </a:r>
-            <a:endParaRPr lang="en-US" sz="1600" dirty="0"/>
+            <a:endParaRPr lang="en-US" sz="1200" dirty="0"/>
           </a:p>
         </p:txBody>
       </p:sp>
@@ -5226,7 +5291,7 @@
         </p:nvCxnSpPr>
         <p:spPr>
           <a:xfrm>
-            <a:off x="7009562" y="2144013"/>
+            <a:off x="7009562" y="2136925"/>
             <a:ext cx="703247" cy="700053"/>
           </a:xfrm>
           <a:prstGeom prst="line">
@@ -5262,7 +5327,7 @@
         </p:nvCxnSpPr>
         <p:spPr>
           <a:xfrm>
-            <a:off x="7709099" y="2146512"/>
+            <a:off x="7709099" y="2132336"/>
             <a:ext cx="703247" cy="700053"/>
           </a:xfrm>
           <a:prstGeom prst="line">
@@ -5515,7 +5580,7 @@
         </p:nvCxnSpPr>
         <p:spPr>
           <a:xfrm>
-            <a:off x="4326152" y="5143842"/>
+            <a:off x="4326152" y="5129666"/>
             <a:ext cx="703247" cy="700053"/>
           </a:xfrm>
           <a:prstGeom prst="line">
@@ -5572,36 +5637,6 @@
           </a:p>
         </p:txBody>
       </p:sp>
-      <p:sp>
-        <p:nvSpPr>
-          <p:cNvPr id="141" name="TextBox 140"/>
-          <p:cNvSpPr txBox="1"/>
-          <p:nvPr/>
-        </p:nvSpPr>
-        <p:spPr>
-          <a:xfrm>
-            <a:off x="5394942" y="4349799"/>
-            <a:ext cx="309700" cy="584904"/>
-          </a:xfrm>
-          <a:prstGeom prst="rect">
-            <a:avLst/>
-          </a:prstGeom>
-          <a:noFill/>
-        </p:spPr>
-        <p:txBody>
-          <a:bodyPr wrap="none" rtlCol="0">
-            <a:spAutoFit/>
-          </a:bodyPr>
-          <a:lstStyle/>
-          <a:p>
-            <a:r>
-              <a:rPr lang="en-US" sz="3201" dirty="0"/>
-              <a:t>-</a:t>
-            </a:r>
-            <a:endParaRPr lang="en-US" sz="2000" dirty="0"/>
-          </a:p>
-        </p:txBody>
-      </p:sp>
       <p:cxnSp>
         <p:nvCxnSpPr>
           <p:cNvPr id="142" name="Straight Connector 141"/>
@@ -5610,7 +5645,7 @@
         </p:nvCxnSpPr>
         <p:spPr>
           <a:xfrm>
-            <a:off x="5049037" y="4440101"/>
+            <a:off x="5027773" y="4433013"/>
             <a:ext cx="703247" cy="700053"/>
           </a:xfrm>
           <a:prstGeom prst="line">
@@ -5646,7 +5681,7 @@
         </p:nvSpPr>
         <p:spPr>
           <a:xfrm>
-            <a:off x="5563632" y="4366602"/>
+            <a:off x="5521104" y="4366602"/>
             <a:ext cx="276038" cy="307905"/>
           </a:xfrm>
           <a:prstGeom prst="rect">
@@ -5764,41 +5799,6 @@
           </a:fontRef>
         </p:style>
       </p:cxnSp>
-      <p:cxnSp>
-        <p:nvCxnSpPr>
-          <p:cNvPr id="157" name="Straight Connector 156"/>
-          <p:cNvCxnSpPr/>
-          <p:nvPr/>
-        </p:nvCxnSpPr>
-        <p:spPr>
-          <a:xfrm>
-            <a:off x="5033801" y="5511598"/>
-            <a:ext cx="320040" cy="5031"/>
-          </a:xfrm>
-          <a:prstGeom prst="line">
-            <a:avLst/>
-          </a:prstGeom>
-          <a:ln>
-            <a:solidFill>
-              <a:schemeClr val="tx1"/>
-            </a:solidFill>
-          </a:ln>
-        </p:spPr>
-        <p:style>
-          <a:lnRef idx="1">
-            <a:schemeClr val="accent1"/>
-          </a:lnRef>
-          <a:fillRef idx="0">
-            <a:schemeClr val="accent1"/>
-          </a:fillRef>
-          <a:effectRef idx="0">
-            <a:schemeClr val="accent1"/>
-          </a:effectRef>
-          <a:fontRef idx="minor">
-            <a:schemeClr val="tx1"/>
-          </a:fontRef>
-        </p:style>
-      </p:cxnSp>
       <p:sp>
         <p:nvSpPr>
           <p:cNvPr id="163" name="Rectangle 162"/>
@@ -5934,36 +5934,6 @@
               <a:t> / X}</a:t>
             </a:r>
             <a:endParaRPr lang="en-US" sz="1401" dirty="0"/>
-          </a:p>
-        </p:txBody>
-      </p:sp>
-      <p:sp>
-        <p:nvSpPr>
-          <p:cNvPr id="168" name="TextBox 167"/>
-          <p:cNvSpPr txBox="1"/>
-          <p:nvPr/>
-        </p:nvSpPr>
-        <p:spPr>
-          <a:xfrm>
-            <a:off x="5061624" y="5431542"/>
-            <a:ext cx="309700" cy="584904"/>
-          </a:xfrm>
-          <a:prstGeom prst="rect">
-            <a:avLst/>
-          </a:prstGeom>
-          <a:noFill/>
-        </p:spPr>
-        <p:txBody>
-          <a:bodyPr wrap="none" rtlCol="0">
-            <a:spAutoFit/>
-          </a:bodyPr>
-          <a:lstStyle/>
-          <a:p>
-            <a:r>
-              <a:rPr lang="en-US" sz="3201" dirty="0"/>
-              <a:t>-</a:t>
-            </a:r>
-            <a:endParaRPr lang="en-US" sz="2000" dirty="0"/>
           </a:p>
         </p:txBody>
       </p:sp>
@@ -6734,6 +6704,41 @@
           </a:p>
         </p:txBody>
       </p:sp>
+      <p:cxnSp>
+        <p:nvCxnSpPr>
+          <p:cNvPr id="109" name="Straight Connector 108"/>
+          <p:cNvCxnSpPr/>
+          <p:nvPr/>
+        </p:nvCxnSpPr>
+        <p:spPr>
+          <a:xfrm flipH="1">
+            <a:off x="5015939" y="5493491"/>
+            <a:ext cx="331968" cy="0"/>
+          </a:xfrm>
+          <a:prstGeom prst="line">
+            <a:avLst/>
+          </a:prstGeom>
+          <a:ln>
+            <a:solidFill>
+              <a:schemeClr val="tx1"/>
+            </a:solidFill>
+          </a:ln>
+        </p:spPr>
+        <p:style>
+          <a:lnRef idx="1">
+            <a:schemeClr val="accent1"/>
+          </a:lnRef>
+          <a:fillRef idx="0">
+            <a:schemeClr val="accent1"/>
+          </a:fillRef>
+          <a:effectRef idx="0">
+            <a:schemeClr val="accent1"/>
+          </a:effectRef>
+          <a:fontRef idx="minor">
+            <a:schemeClr val="tx1"/>
+          </a:fontRef>
+        </p:style>
+      </p:cxnSp>
     </p:spTree>
     <p:extLst>
       <p:ext uri="{BB962C8B-B14F-4D97-AF65-F5344CB8AC3E}">

</xml_diff>

<commit_message>
Fixing parameters in the model to fit the parameters space file
</commit_message>
<xml_diff>
--- a/Documentation/Parameters space.pptx
+++ b/Documentation/Parameters space.pptx
@@ -3041,7 +3041,7 @@
         </p:nvSpPr>
         <p:spPr>
           <a:xfrm>
-            <a:off x="5037700" y="5148807"/>
+            <a:off x="5066276" y="5163095"/>
             <a:ext cx="312906" cy="400110"/>
           </a:xfrm>
           <a:prstGeom prst="rect">
@@ -4434,7 +4434,7 @@
           <a:lstStyle/>
           <a:p>
             <a:r>
-              <a:rPr lang="en-US"/>
+              <a:rPr lang="en-US" dirty="0" smtClean="0"/>
               <a:t>F</a:t>
             </a:r>
             <a:endParaRPr lang="en-US" dirty="0"/>
@@ -4524,7 +4524,7 @@
           <a:lstStyle/>
           <a:p>
             <a:r>
-              <a:rPr lang="en-US"/>
+              <a:rPr lang="en-US" dirty="0"/>
               <a:t>Non-D</a:t>
             </a:r>
           </a:p>
@@ -4944,9 +4944,10 @@
           <a:lstStyle/>
           <a:p>
             <a:r>
-              <a:rPr lang="en-US" dirty="0"/>
+              <a:rPr lang="en-US" dirty="0" smtClean="0"/>
               <a:t>D</a:t>
             </a:r>
+            <a:endParaRPr lang="en-US" dirty="0"/>
           </a:p>
         </p:txBody>
       </p:sp>

</xml_diff>

<commit_message>
New parameters set at friday discussion
</commit_message>
<xml_diff>
--- a/Documentation/Parameters space.pptx
+++ b/Documentation/Parameters space.pptx
@@ -243,7 +243,7 @@
           <a:p>
             <a:fld id="{82230ED6-5AAA-0A4A-9B1D-EC2D861041EB}" type="datetimeFigureOut">
               <a:rPr lang="en-US" smtClean="0"/>
-              <a:t>8/8/16</a:t>
+              <a:t>8/26/16</a:t>
             </a:fld>
             <a:endParaRPr lang="en-US"/>
           </a:p>
@@ -413,7 +413,7 @@
           <a:p>
             <a:fld id="{82230ED6-5AAA-0A4A-9B1D-EC2D861041EB}" type="datetimeFigureOut">
               <a:rPr lang="en-US" smtClean="0"/>
-              <a:t>8/8/16</a:t>
+              <a:t>8/26/16</a:t>
             </a:fld>
             <a:endParaRPr lang="en-US"/>
           </a:p>
@@ -593,7 +593,7 @@
           <a:p>
             <a:fld id="{82230ED6-5AAA-0A4A-9B1D-EC2D861041EB}" type="datetimeFigureOut">
               <a:rPr lang="en-US" smtClean="0"/>
-              <a:t>8/8/16</a:t>
+              <a:t>8/26/16</a:t>
             </a:fld>
             <a:endParaRPr lang="en-US"/>
           </a:p>
@@ -763,7 +763,7 @@
           <a:p>
             <a:fld id="{82230ED6-5AAA-0A4A-9B1D-EC2D861041EB}" type="datetimeFigureOut">
               <a:rPr lang="en-US" smtClean="0"/>
-              <a:t>8/8/16</a:t>
+              <a:t>8/26/16</a:t>
             </a:fld>
             <a:endParaRPr lang="en-US"/>
           </a:p>
@@ -1009,7 +1009,7 @@
           <a:p>
             <a:fld id="{82230ED6-5AAA-0A4A-9B1D-EC2D861041EB}" type="datetimeFigureOut">
               <a:rPr lang="en-US" smtClean="0"/>
-              <a:t>8/8/16</a:t>
+              <a:t>8/26/16</a:t>
             </a:fld>
             <a:endParaRPr lang="en-US"/>
           </a:p>
@@ -1241,7 +1241,7 @@
           <a:p>
             <a:fld id="{82230ED6-5AAA-0A4A-9B1D-EC2D861041EB}" type="datetimeFigureOut">
               <a:rPr lang="en-US" smtClean="0"/>
-              <a:t>8/8/16</a:t>
+              <a:t>8/26/16</a:t>
             </a:fld>
             <a:endParaRPr lang="en-US"/>
           </a:p>
@@ -1608,7 +1608,7 @@
           <a:p>
             <a:fld id="{82230ED6-5AAA-0A4A-9B1D-EC2D861041EB}" type="datetimeFigureOut">
               <a:rPr lang="en-US" smtClean="0"/>
-              <a:t>8/8/16</a:t>
+              <a:t>8/26/16</a:t>
             </a:fld>
             <a:endParaRPr lang="en-US"/>
           </a:p>
@@ -1726,7 +1726,7 @@
           <a:p>
             <a:fld id="{82230ED6-5AAA-0A4A-9B1D-EC2D861041EB}" type="datetimeFigureOut">
               <a:rPr lang="en-US" smtClean="0"/>
-              <a:t>8/8/16</a:t>
+              <a:t>8/26/16</a:t>
             </a:fld>
             <a:endParaRPr lang="en-US"/>
           </a:p>
@@ -1821,7 +1821,7 @@
           <a:p>
             <a:fld id="{82230ED6-5AAA-0A4A-9B1D-EC2D861041EB}" type="datetimeFigureOut">
               <a:rPr lang="en-US" smtClean="0"/>
-              <a:t>8/8/16</a:t>
+              <a:t>8/26/16</a:t>
             </a:fld>
             <a:endParaRPr lang="en-US"/>
           </a:p>
@@ -2098,7 +2098,7 @@
           <a:p>
             <a:fld id="{82230ED6-5AAA-0A4A-9B1D-EC2D861041EB}" type="datetimeFigureOut">
               <a:rPr lang="en-US" smtClean="0"/>
-              <a:t>8/8/16</a:t>
+              <a:t>8/26/16</a:t>
             </a:fld>
             <a:endParaRPr lang="en-US"/>
           </a:p>
@@ -2355,7 +2355,7 @@
           <a:p>
             <a:fld id="{82230ED6-5AAA-0A4A-9B1D-EC2D861041EB}" type="datetimeFigureOut">
               <a:rPr lang="en-US" smtClean="0"/>
-              <a:t>8/8/16</a:t>
+              <a:t>8/26/16</a:t>
             </a:fld>
             <a:endParaRPr lang="en-US"/>
           </a:p>
@@ -2568,7 +2568,7 @@
           <a:p>
             <a:fld id="{82230ED6-5AAA-0A4A-9B1D-EC2D861041EB}" type="datetimeFigureOut">
               <a:rPr lang="en-US" smtClean="0"/>
-              <a:t>8/8/16</a:t>
+              <a:t>8/26/16</a:t>
             </a:fld>
             <a:endParaRPr lang="en-US"/>
           </a:p>
@@ -6153,266 +6153,55 @@
           </a:p>
         </p:txBody>
       </p:sp>
-      <p:grpSp>
-        <p:nvGrpSpPr>
-          <p:cNvPr id="176" name="Group 175"/>
-          <p:cNvGrpSpPr/>
-          <p:nvPr/>
-        </p:nvGrpSpPr>
-        <p:grpSpPr>
+      <p:sp>
+        <p:nvSpPr>
+          <p:cNvPr id="178" name="Rectangle 177"/>
+          <p:cNvSpPr/>
+          <p:nvPr/>
+        </p:nvSpPr>
+        <p:spPr>
           <a:xfrm>
             <a:off x="7068371" y="4427991"/>
-            <a:ext cx="1396332" cy="1396332"/>
-            <a:chOff x="965200" y="1282700"/>
-            <a:chExt cx="1828800" cy="1828800"/>
-          </a:xfrm>
-        </p:grpSpPr>
-        <p:sp>
-          <p:nvSpPr>
-            <p:cNvPr id="177" name="Rectangle 176"/>
-            <p:cNvSpPr/>
-            <p:nvPr/>
-          </p:nvSpPr>
-          <p:spPr>
-            <a:xfrm>
-              <a:off x="965200" y="1282700"/>
-              <a:ext cx="1828800" cy="1828800"/>
-            </a:xfrm>
-            <a:prstGeom prst="rect">
+            <a:ext cx="1402938" cy="1402938"/>
+          </a:xfrm>
+          <a:prstGeom prst="rect">
+            <a:avLst/>
+          </a:prstGeom>
+          <a:noFill/>
+          <a:ln>
+            <a:solidFill>
+              <a:schemeClr val="tx1"/>
+            </a:solidFill>
+          </a:ln>
+        </p:spPr>
+        <p:style>
+          <a:lnRef idx="2">
+            <a:schemeClr val="accent6"/>
+          </a:lnRef>
+          <a:fillRef idx="1">
+            <a:schemeClr val="lt1"/>
+          </a:fillRef>
+          <a:effectRef idx="0">
+            <a:schemeClr val="accent6"/>
+          </a:effectRef>
+          <a:fontRef idx="minor">
+            <a:schemeClr val="dk1"/>
+          </a:fontRef>
+        </p:style>
+        <p:txBody>
+          <a:bodyPr rot="0" spcFirstLastPara="0" vertOverflow="overflow" horzOverflow="overflow" vert="horz" wrap="square" lIns="91440" tIns="45720" rIns="91440" bIns="45720" numCol="1" spcCol="0" rtlCol="0" fromWordArt="0" anchor="ctr" anchorCtr="0" forceAA="0" compatLnSpc="1">
+            <a:prstTxWarp prst="textNoShape">
               <a:avLst/>
-            </a:prstGeom>
-            <a:noFill/>
-            <a:ln>
-              <a:solidFill>
-                <a:schemeClr val="tx1"/>
-              </a:solidFill>
-            </a:ln>
-          </p:spPr>
-          <p:style>
-            <a:lnRef idx="2">
-              <a:schemeClr val="accent6"/>
-            </a:lnRef>
-            <a:fillRef idx="1">
-              <a:schemeClr val="lt1"/>
-            </a:fillRef>
-            <a:effectRef idx="0">
-              <a:schemeClr val="accent6"/>
-            </a:effectRef>
-            <a:fontRef idx="minor">
-              <a:schemeClr val="dk1"/>
-            </a:fontRef>
-          </p:style>
-          <p:txBody>
-            <a:bodyPr rot="0" spcFirstLastPara="0" vertOverflow="overflow" horzOverflow="overflow" vert="horz" wrap="square" lIns="91440" tIns="45720" rIns="91440" bIns="45720" numCol="1" spcCol="0" rtlCol="0" fromWordArt="0" anchor="ctr" anchorCtr="0" forceAA="0" compatLnSpc="1">
-              <a:prstTxWarp prst="textNoShape">
-                <a:avLst/>
-              </a:prstTxWarp>
-              <a:noAutofit/>
-            </a:bodyPr>
-            <a:lstStyle/>
-            <a:p>
-              <a:pPr algn="ctr"/>
-              <a:endParaRPr lang="en-US" b="1"/>
-            </a:p>
-          </p:txBody>
-        </p:sp>
-        <p:sp>
-          <p:nvSpPr>
-            <p:cNvPr id="178" name="Rectangle 177"/>
-            <p:cNvSpPr/>
-            <p:nvPr/>
-          </p:nvSpPr>
-          <p:spPr>
-            <a:xfrm>
-              <a:off x="965200" y="1282700"/>
-              <a:ext cx="914400" cy="914400"/>
-            </a:xfrm>
-            <a:prstGeom prst="rect">
-              <a:avLst/>
-            </a:prstGeom>
-            <a:noFill/>
-            <a:ln>
-              <a:solidFill>
-                <a:schemeClr val="tx1"/>
-              </a:solidFill>
-            </a:ln>
-          </p:spPr>
-          <p:style>
-            <a:lnRef idx="2">
-              <a:schemeClr val="accent6"/>
-            </a:lnRef>
-            <a:fillRef idx="1">
-              <a:schemeClr val="lt1"/>
-            </a:fillRef>
-            <a:effectRef idx="0">
-              <a:schemeClr val="accent6"/>
-            </a:effectRef>
-            <a:fontRef idx="minor">
-              <a:schemeClr val="dk1"/>
-            </a:fontRef>
-          </p:style>
-          <p:txBody>
-            <a:bodyPr rot="0" spcFirstLastPara="0" vertOverflow="overflow" horzOverflow="overflow" vert="horz" wrap="square" lIns="91440" tIns="45720" rIns="91440" bIns="45720" numCol="1" spcCol="0" rtlCol="0" fromWordArt="0" anchor="ctr" anchorCtr="0" forceAA="0" compatLnSpc="1">
-              <a:prstTxWarp prst="textNoShape">
-                <a:avLst/>
-              </a:prstTxWarp>
-              <a:noAutofit/>
-            </a:bodyPr>
-            <a:lstStyle/>
-            <a:p>
-              <a:pPr algn="ctr"/>
-              <a:endParaRPr lang="en-US" b="1"/>
-            </a:p>
-          </p:txBody>
-        </p:sp>
-        <p:sp>
-          <p:nvSpPr>
-            <p:cNvPr id="179" name="Rectangle 178"/>
-            <p:cNvSpPr/>
-            <p:nvPr/>
-          </p:nvSpPr>
-          <p:spPr>
-            <a:xfrm>
-              <a:off x="965200" y="2197100"/>
-              <a:ext cx="914400" cy="914400"/>
-            </a:xfrm>
-            <a:prstGeom prst="rect">
-              <a:avLst/>
-            </a:prstGeom>
-            <a:noFill/>
-            <a:ln>
-              <a:solidFill>
-                <a:schemeClr val="tx1"/>
-              </a:solidFill>
-            </a:ln>
-          </p:spPr>
-          <p:style>
-            <a:lnRef idx="2">
-              <a:schemeClr val="accent6"/>
-            </a:lnRef>
-            <a:fillRef idx="1">
-              <a:schemeClr val="lt1"/>
-            </a:fillRef>
-            <a:effectRef idx="0">
-              <a:schemeClr val="accent6"/>
-            </a:effectRef>
-            <a:fontRef idx="minor">
-              <a:schemeClr val="dk1"/>
-            </a:fontRef>
-          </p:style>
-          <p:txBody>
-            <a:bodyPr rot="0" spcFirstLastPara="0" vertOverflow="overflow" horzOverflow="overflow" vert="horz" wrap="square" lIns="91440" tIns="45720" rIns="91440" bIns="45720" numCol="1" spcCol="0" rtlCol="0" fromWordArt="0" anchor="ctr" anchorCtr="0" forceAA="0" compatLnSpc="1">
-              <a:prstTxWarp prst="textNoShape">
-                <a:avLst/>
-              </a:prstTxWarp>
-              <a:noAutofit/>
-            </a:bodyPr>
-            <a:lstStyle/>
-            <a:p>
-              <a:pPr algn="ctr"/>
-              <a:endParaRPr lang="en-US" b="1"/>
-            </a:p>
-          </p:txBody>
-        </p:sp>
-        <p:sp>
-          <p:nvSpPr>
-            <p:cNvPr id="180" name="Rectangle 179"/>
-            <p:cNvSpPr/>
-            <p:nvPr/>
-          </p:nvSpPr>
-          <p:spPr>
-            <a:xfrm>
-              <a:off x="1879600" y="1282700"/>
-              <a:ext cx="914400" cy="914400"/>
-            </a:xfrm>
-            <a:prstGeom prst="rect">
-              <a:avLst/>
-            </a:prstGeom>
-            <a:noFill/>
-            <a:ln>
-              <a:solidFill>
-                <a:schemeClr val="tx1"/>
-              </a:solidFill>
-            </a:ln>
-          </p:spPr>
-          <p:style>
-            <a:lnRef idx="2">
-              <a:schemeClr val="accent6"/>
-            </a:lnRef>
-            <a:fillRef idx="1">
-              <a:schemeClr val="lt1"/>
-            </a:fillRef>
-            <a:effectRef idx="0">
-              <a:schemeClr val="accent6"/>
-            </a:effectRef>
-            <a:fontRef idx="minor">
-              <a:schemeClr val="dk1"/>
-            </a:fontRef>
-          </p:style>
-          <p:txBody>
-            <a:bodyPr rot="0" spcFirstLastPara="0" vertOverflow="overflow" horzOverflow="overflow" vert="horz" wrap="square" lIns="91440" tIns="45720" rIns="91440" bIns="45720" numCol="1" spcCol="0" rtlCol="0" fromWordArt="0" anchor="ctr" anchorCtr="0" forceAA="0" compatLnSpc="1">
-              <a:prstTxWarp prst="textNoShape">
-                <a:avLst/>
-              </a:prstTxWarp>
-              <a:noAutofit/>
-            </a:bodyPr>
-            <a:lstStyle/>
-            <a:p>
-              <a:pPr algn="ctr"/>
-              <a:endParaRPr lang="en-US" b="1"/>
-            </a:p>
-          </p:txBody>
-        </p:sp>
-        <p:sp>
-          <p:nvSpPr>
-            <p:cNvPr id="181" name="Rectangle 180"/>
-            <p:cNvSpPr/>
-            <p:nvPr/>
-          </p:nvSpPr>
-          <p:spPr>
-            <a:xfrm>
-              <a:off x="1879600" y="2197100"/>
-              <a:ext cx="914400" cy="914400"/>
-            </a:xfrm>
-            <a:prstGeom prst="rect">
-              <a:avLst/>
-            </a:prstGeom>
-            <a:noFill/>
-            <a:ln>
-              <a:solidFill>
-                <a:schemeClr val="tx1"/>
-              </a:solidFill>
-            </a:ln>
-          </p:spPr>
-          <p:style>
-            <a:lnRef idx="2">
-              <a:schemeClr val="accent6"/>
-            </a:lnRef>
-            <a:fillRef idx="1">
-              <a:schemeClr val="lt1"/>
-            </a:fillRef>
-            <a:effectRef idx="0">
-              <a:schemeClr val="accent6"/>
-            </a:effectRef>
-            <a:fontRef idx="minor">
-              <a:schemeClr val="dk1"/>
-            </a:fontRef>
-          </p:style>
-          <p:txBody>
-            <a:bodyPr rot="0" spcFirstLastPara="0" vertOverflow="overflow" horzOverflow="overflow" vert="horz" wrap="square" lIns="91440" tIns="45720" rIns="91440" bIns="45720" numCol="1" spcCol="0" rtlCol="0" fromWordArt="0" anchor="ctr" anchorCtr="0" forceAA="0" compatLnSpc="1">
-              <a:prstTxWarp prst="textNoShape">
-                <a:avLst/>
-              </a:prstTxWarp>
-              <a:noAutofit/>
-            </a:bodyPr>
-            <a:lstStyle/>
-            <a:p>
-              <a:pPr algn="ctr"/>
-              <a:endParaRPr lang="en-US" b="1"/>
-            </a:p>
-          </p:txBody>
-        </p:sp>
-      </p:grpSp>
+            </a:prstTxWarp>
+            <a:noAutofit/>
+          </a:bodyPr>
+          <a:lstStyle/>
+          <a:p>
+            <a:pPr algn="ctr"/>
+            <a:endParaRPr lang="en-US" b="1"/>
+          </a:p>
+        </p:txBody>
+      </p:sp>
       <p:sp>
         <p:nvSpPr>
           <p:cNvPr id="182" name="TextBox 181"/>

</xml_diff>

<commit_message>
New design for the simulations run
</commit_message>
<xml_diff>
--- a/Documentation/Parameters space.pptx
+++ b/Documentation/Parameters space.pptx
@@ -243,7 +243,7 @@
           <a:p>
             <a:fld id="{82230ED6-5AAA-0A4A-9B1D-EC2D861041EB}" type="datetimeFigureOut">
               <a:rPr lang="en-US" smtClean="0"/>
-              <a:t>8/26/16</a:t>
+              <a:t>9/23/16</a:t>
             </a:fld>
             <a:endParaRPr lang="en-US"/>
           </a:p>
@@ -413,7 +413,7 @@
           <a:p>
             <a:fld id="{82230ED6-5AAA-0A4A-9B1D-EC2D861041EB}" type="datetimeFigureOut">
               <a:rPr lang="en-US" smtClean="0"/>
-              <a:t>8/26/16</a:t>
+              <a:t>9/23/16</a:t>
             </a:fld>
             <a:endParaRPr lang="en-US"/>
           </a:p>
@@ -593,7 +593,7 @@
           <a:p>
             <a:fld id="{82230ED6-5AAA-0A4A-9B1D-EC2D861041EB}" type="datetimeFigureOut">
               <a:rPr lang="en-US" smtClean="0"/>
-              <a:t>8/26/16</a:t>
+              <a:t>9/23/16</a:t>
             </a:fld>
             <a:endParaRPr lang="en-US"/>
           </a:p>
@@ -763,7 +763,7 @@
           <a:p>
             <a:fld id="{82230ED6-5AAA-0A4A-9B1D-EC2D861041EB}" type="datetimeFigureOut">
               <a:rPr lang="en-US" smtClean="0"/>
-              <a:t>8/26/16</a:t>
+              <a:t>9/23/16</a:t>
             </a:fld>
             <a:endParaRPr lang="en-US"/>
           </a:p>
@@ -1009,7 +1009,7 @@
           <a:p>
             <a:fld id="{82230ED6-5AAA-0A4A-9B1D-EC2D861041EB}" type="datetimeFigureOut">
               <a:rPr lang="en-US" smtClean="0"/>
-              <a:t>8/26/16</a:t>
+              <a:t>9/23/16</a:t>
             </a:fld>
             <a:endParaRPr lang="en-US"/>
           </a:p>
@@ -1241,7 +1241,7 @@
           <a:p>
             <a:fld id="{82230ED6-5AAA-0A4A-9B1D-EC2D861041EB}" type="datetimeFigureOut">
               <a:rPr lang="en-US" smtClean="0"/>
-              <a:t>8/26/16</a:t>
+              <a:t>9/23/16</a:t>
             </a:fld>
             <a:endParaRPr lang="en-US"/>
           </a:p>
@@ -1608,7 +1608,7 @@
           <a:p>
             <a:fld id="{82230ED6-5AAA-0A4A-9B1D-EC2D861041EB}" type="datetimeFigureOut">
               <a:rPr lang="en-US" smtClean="0"/>
-              <a:t>8/26/16</a:t>
+              <a:t>9/23/16</a:t>
             </a:fld>
             <a:endParaRPr lang="en-US"/>
           </a:p>
@@ -1726,7 +1726,7 @@
           <a:p>
             <a:fld id="{82230ED6-5AAA-0A4A-9B1D-EC2D861041EB}" type="datetimeFigureOut">
               <a:rPr lang="en-US" smtClean="0"/>
-              <a:t>8/26/16</a:t>
+              <a:t>9/23/16</a:t>
             </a:fld>
             <a:endParaRPr lang="en-US"/>
           </a:p>
@@ -1821,7 +1821,7 @@
           <a:p>
             <a:fld id="{82230ED6-5AAA-0A4A-9B1D-EC2D861041EB}" type="datetimeFigureOut">
               <a:rPr lang="en-US" smtClean="0"/>
-              <a:t>8/26/16</a:t>
+              <a:t>9/23/16</a:t>
             </a:fld>
             <a:endParaRPr lang="en-US"/>
           </a:p>
@@ -2098,7 +2098,7 @@
           <a:p>
             <a:fld id="{82230ED6-5AAA-0A4A-9B1D-EC2D861041EB}" type="datetimeFigureOut">
               <a:rPr lang="en-US" smtClean="0"/>
-              <a:t>8/26/16</a:t>
+              <a:t>9/23/16</a:t>
             </a:fld>
             <a:endParaRPr lang="en-US"/>
           </a:p>
@@ -2355,7 +2355,7 @@
           <a:p>
             <a:fld id="{82230ED6-5AAA-0A4A-9B1D-EC2D861041EB}" type="datetimeFigureOut">
               <a:rPr lang="en-US" smtClean="0"/>
-              <a:t>8/26/16</a:t>
+              <a:t>9/23/16</a:t>
             </a:fld>
             <a:endParaRPr lang="en-US"/>
           </a:p>
@@ -2568,7 +2568,7 @@
           <a:p>
             <a:fld id="{82230ED6-5AAA-0A4A-9B1D-EC2D861041EB}" type="datetimeFigureOut">
               <a:rPr lang="en-US" smtClean="0"/>
-              <a:t>8/26/16</a:t>
+              <a:t>9/23/16</a:t>
             </a:fld>
             <a:endParaRPr lang="en-US"/>
           </a:p>
@@ -2975,14 +2975,14 @@
       </p:grpSpPr>
       <p:sp>
         <p:nvSpPr>
-          <p:cNvPr id="168" name="TextBox 167"/>
+          <p:cNvPr id="171" name="TextBox 170"/>
           <p:cNvSpPr txBox="1"/>
           <p:nvPr/>
         </p:nvSpPr>
         <p:spPr>
           <a:xfrm>
-            <a:off x="5061624" y="5431542"/>
-            <a:ext cx="309700" cy="584904"/>
+            <a:off x="7296324" y="2162479"/>
+            <a:ext cx="338554" cy="461793"/>
           </a:xfrm>
           <a:prstGeom prst="rect">
             <a:avLst/>
@@ -2996,100 +2996,10 @@
           <a:lstStyle/>
           <a:p>
             <a:r>
-              <a:rPr lang="en-US" sz="3201" dirty="0"/>
-              <a:t>-</a:t>
-            </a:r>
-            <a:endParaRPr lang="en-US" sz="2000" dirty="0"/>
-          </a:p>
-        </p:txBody>
-      </p:sp>
-      <p:sp>
-        <p:nvSpPr>
-          <p:cNvPr id="141" name="TextBox 140"/>
-          <p:cNvSpPr txBox="1"/>
-          <p:nvPr/>
-        </p:nvSpPr>
-        <p:spPr>
-          <a:xfrm>
-            <a:off x="5394942" y="4349799"/>
-            <a:ext cx="309700" cy="584904"/>
-          </a:xfrm>
-          <a:prstGeom prst="rect">
-            <a:avLst/>
-          </a:prstGeom>
-          <a:noFill/>
-        </p:spPr>
-        <p:txBody>
-          <a:bodyPr wrap="none" rtlCol="0">
-            <a:spAutoFit/>
-          </a:bodyPr>
-          <a:lstStyle/>
-          <a:p>
-            <a:r>
-              <a:rPr lang="en-US" sz="3201" dirty="0"/>
-              <a:t>-</a:t>
-            </a:r>
-            <a:endParaRPr lang="en-US" sz="2000" dirty="0"/>
-          </a:p>
-        </p:txBody>
-      </p:sp>
-      <p:sp>
-        <p:nvSpPr>
-          <p:cNvPr id="149" name="TextBox 148"/>
-          <p:cNvSpPr txBox="1"/>
-          <p:nvPr/>
-        </p:nvSpPr>
-        <p:spPr>
-          <a:xfrm>
-            <a:off x="5066276" y="5163095"/>
-            <a:ext cx="312906" cy="400110"/>
-          </a:xfrm>
-          <a:prstGeom prst="rect">
-            <a:avLst/>
-          </a:prstGeom>
-          <a:noFill/>
-        </p:spPr>
-        <p:txBody>
-          <a:bodyPr wrap="none" rtlCol="0">
-            <a:spAutoFit/>
-          </a:bodyPr>
-          <a:lstStyle/>
-          <a:p>
-            <a:r>
-              <a:rPr lang="en-US" sz="2000" dirty="0"/>
+              <a:rPr lang="en-US" sz="2401" dirty="0" smtClean="0"/>
               <a:t>+</a:t>
             </a:r>
-            <a:endParaRPr lang="en-US" sz="1200" dirty="0"/>
-          </a:p>
-        </p:txBody>
-      </p:sp>
-      <p:sp>
-        <p:nvSpPr>
-          <p:cNvPr id="121" name="TextBox 120"/>
-          <p:cNvSpPr txBox="1"/>
-          <p:nvPr/>
-        </p:nvSpPr>
-        <p:spPr>
-          <a:xfrm>
-            <a:off x="1988656" y="5098291"/>
-            <a:ext cx="309700" cy="584904"/>
-          </a:xfrm>
-          <a:prstGeom prst="rect">
-            <a:avLst/>
-          </a:prstGeom>
-          <a:noFill/>
-        </p:spPr>
-        <p:txBody>
-          <a:bodyPr wrap="none" rtlCol="0">
-            <a:spAutoFit/>
-          </a:bodyPr>
-          <a:lstStyle/>
-          <a:p>
-            <a:r>
-              <a:rPr lang="en-US" sz="3201" dirty="0"/>
-              <a:t>-</a:t>
-            </a:r>
-            <a:endParaRPr lang="en-US" sz="2000" dirty="0"/>
+            <a:endParaRPr lang="en-US" sz="1600" dirty="0"/>
           </a:p>
         </p:txBody>
       </p:sp>
@@ -5250,42 +5160,6 @@
       </p:sp>
       <p:cxnSp>
         <p:nvCxnSpPr>
-          <p:cNvPr id="89" name="Straight Connector 88"/>
-          <p:cNvCxnSpPr/>
-          <p:nvPr/>
-        </p:nvCxnSpPr>
-        <p:spPr>
-          <a:xfrm>
-            <a:off x="1642751" y="5156509"/>
-            <a:ext cx="703247" cy="700053"/>
-          </a:xfrm>
-          <a:prstGeom prst="line">
-            <a:avLst/>
-          </a:prstGeom>
-          <a:ln>
-            <a:solidFill>
-              <a:schemeClr val="tx1"/>
-            </a:solidFill>
-            <a:prstDash val="dashDot"/>
-          </a:ln>
-        </p:spPr>
-        <p:style>
-          <a:lnRef idx="1">
-            <a:schemeClr val="accent1"/>
-          </a:lnRef>
-          <a:fillRef idx="0">
-            <a:schemeClr val="accent1"/>
-          </a:fillRef>
-          <a:effectRef idx="0">
-            <a:schemeClr val="accent1"/>
-          </a:effectRef>
-          <a:fontRef idx="minor">
-            <a:schemeClr val="tx1"/>
-          </a:fontRef>
-        </p:style>
-      </p:cxnSp>
-      <p:cxnSp>
-        <p:nvCxnSpPr>
           <p:cNvPr id="91" name="Straight Connector 90"/>
           <p:cNvCxnSpPr/>
           <p:nvPr/>
@@ -5364,8 +5238,251 @@
         </p:nvSpPr>
         <p:spPr>
           <a:xfrm>
-            <a:off x="9625034" y="5431541"/>
-            <a:ext cx="2952155" cy="1170192"/>
+            <a:off x="9434830" y="2531549"/>
+            <a:ext cx="3073983" cy="307905"/>
+          </a:xfrm>
+          <a:prstGeom prst="rect">
+            <a:avLst/>
+          </a:prstGeom>
+          <a:noFill/>
+          <a:ln>
+            <a:noFill/>
+          </a:ln>
+        </p:spPr>
+        <p:txBody>
+          <a:bodyPr wrap="none" rtlCol="0">
+            <a:spAutoFit/>
+          </a:bodyPr>
+          <a:lstStyle/>
+          <a:p>
+            <a:pPr algn="just"/>
+            <a:r>
+              <a:rPr lang="en-US" sz="1401" smtClean="0"/>
+              <a:t>1</a:t>
+            </a:r>
+            <a:r>
+              <a:rPr lang="en-US" sz="1401" smtClean="0"/>
+              <a:t> = Closer </a:t>
+            </a:r>
+            <a:r>
+              <a:rPr lang="en-US" sz="1401" dirty="0"/>
+              <a:t>areas to domestication origin</a:t>
+            </a:r>
+          </a:p>
+        </p:txBody>
+      </p:sp>
+      <p:sp>
+        <p:nvSpPr>
+          <p:cNvPr id="163" name="Rectangle 162"/>
+          <p:cNvSpPr/>
+          <p:nvPr/>
+        </p:nvSpPr>
+        <p:spPr>
+          <a:xfrm>
+            <a:off x="7447175" y="2076433"/>
+            <a:ext cx="276038" cy="307905"/>
+          </a:xfrm>
+          <a:prstGeom prst="rect">
+            <a:avLst/>
+          </a:prstGeom>
+        </p:spPr>
+        <p:txBody>
+          <a:bodyPr wrap="none">
+            <a:spAutoFit/>
+          </a:bodyPr>
+          <a:lstStyle/>
+          <a:p>
+            <a:r>
+              <a:rPr lang="en-US" sz="1401" dirty="0" smtClean="0"/>
+              <a:t>1</a:t>
+            </a:r>
+            <a:endParaRPr lang="en-US" dirty="0"/>
+          </a:p>
+        </p:txBody>
+      </p:sp>
+      <p:sp>
+        <p:nvSpPr>
+          <p:cNvPr id="164" name="Rectangle 163"/>
+          <p:cNvSpPr/>
+          <p:nvPr/>
+        </p:nvSpPr>
+        <p:spPr>
+          <a:xfrm>
+            <a:off x="8177304" y="2089748"/>
+            <a:ext cx="276038" cy="307905"/>
+          </a:xfrm>
+          <a:prstGeom prst="rect">
+            <a:avLst/>
+          </a:prstGeom>
+        </p:spPr>
+        <p:txBody>
+          <a:bodyPr wrap="none">
+            <a:spAutoFit/>
+          </a:bodyPr>
+          <a:lstStyle/>
+          <a:p>
+            <a:r>
+              <a:rPr lang="en-US" sz="1401" dirty="0"/>
+              <a:t>1</a:t>
+            </a:r>
+            <a:endParaRPr lang="en-US" dirty="0"/>
+          </a:p>
+        </p:txBody>
+      </p:sp>
+      <p:sp>
+        <p:nvSpPr>
+          <p:cNvPr id="170" name="TextBox 169"/>
+          <p:cNvSpPr txBox="1"/>
+          <p:nvPr/>
+        </p:nvSpPr>
+        <p:spPr>
+          <a:xfrm>
+            <a:off x="7958720" y="2170885"/>
+            <a:ext cx="338554" cy="461793"/>
+          </a:xfrm>
+          <a:prstGeom prst="rect">
+            <a:avLst/>
+          </a:prstGeom>
+          <a:noFill/>
+        </p:spPr>
+        <p:txBody>
+          <a:bodyPr wrap="none" rtlCol="0">
+            <a:spAutoFit/>
+          </a:bodyPr>
+          <a:lstStyle/>
+          <a:p>
+            <a:r>
+              <a:rPr lang="en-US" sz="2401" dirty="0" smtClean="0"/>
+              <a:t>+</a:t>
+            </a:r>
+            <a:endParaRPr lang="en-US" sz="1600" dirty="0"/>
+          </a:p>
+        </p:txBody>
+      </p:sp>
+      <p:sp>
+        <p:nvSpPr>
+          <p:cNvPr id="172" name="TextBox 171"/>
+          <p:cNvSpPr txBox="1"/>
+          <p:nvPr/>
+        </p:nvSpPr>
+        <p:spPr>
+          <a:xfrm>
+            <a:off x="9940725" y="1455004"/>
+            <a:ext cx="1223605" cy="400110"/>
+          </a:xfrm>
+          <a:prstGeom prst="rect">
+            <a:avLst/>
+          </a:prstGeom>
+          <a:noFill/>
+        </p:spPr>
+        <p:txBody>
+          <a:bodyPr wrap="none" rtlCol="0">
+            <a:spAutoFit/>
+          </a:bodyPr>
+          <a:lstStyle/>
+          <a:p>
+            <a:r>
+              <a:rPr lang="en-US" sz="2000" dirty="0"/>
+              <a:t>++ {p</a:t>
+            </a:r>
+            <a:r>
+              <a:rPr lang="en-US" sz="2000" baseline="-25000" dirty="0"/>
+              <a:t>i</a:t>
+            </a:r>
+            <a:r>
+              <a:rPr lang="en-US" sz="2000" dirty="0"/>
+              <a:t> * L</a:t>
+            </a:r>
+            <a:r>
+              <a:rPr lang="en-US" sz="2000" baseline="-25000" dirty="0"/>
+              <a:t>i</a:t>
+            </a:r>
+            <a:r>
+              <a:rPr lang="en-US" sz="2000" dirty="0"/>
+              <a:t>}</a:t>
+            </a:r>
+            <a:endParaRPr lang="en-US" sz="1401" dirty="0"/>
+          </a:p>
+        </p:txBody>
+      </p:sp>
+      <p:sp>
+        <p:nvSpPr>
+          <p:cNvPr id="173" name="TextBox 172"/>
+          <p:cNvSpPr txBox="1"/>
+          <p:nvPr/>
+        </p:nvSpPr>
+        <p:spPr>
+          <a:xfrm>
+            <a:off x="9783550" y="1941232"/>
+            <a:ext cx="2131994" cy="400110"/>
+          </a:xfrm>
+          <a:prstGeom prst="rect">
+            <a:avLst/>
+          </a:prstGeom>
+          <a:noFill/>
+        </p:spPr>
+        <p:txBody>
+          <a:bodyPr wrap="none" rtlCol="0">
+            <a:spAutoFit/>
+          </a:bodyPr>
+          <a:lstStyle/>
+          <a:p>
+            <a:r>
+              <a:rPr lang="en-US" sz="2000" dirty="0"/>
+              <a:t>L</a:t>
+            </a:r>
+            <a:r>
+              <a:rPr lang="en-US" sz="2000" baseline="-25000" dirty="0" smtClean="0"/>
+              <a:t>i</a:t>
+            </a:r>
+            <a:r>
+              <a:rPr lang="en-US" sz="2000" dirty="0"/>
+              <a:t> = Location factor</a:t>
+            </a:r>
+            <a:endParaRPr lang="en-US" sz="1401" dirty="0"/>
+          </a:p>
+        </p:txBody>
+      </p:sp>
+      <p:sp>
+        <p:nvSpPr>
+          <p:cNvPr id="174" name="TextBox 173"/>
+          <p:cNvSpPr txBox="1"/>
+          <p:nvPr/>
+        </p:nvSpPr>
+        <p:spPr>
+          <a:xfrm>
+            <a:off x="3556262" y="69158"/>
+            <a:ext cx="3179204" cy="584904"/>
+          </a:xfrm>
+          <a:prstGeom prst="rect">
+            <a:avLst/>
+          </a:prstGeom>
+          <a:noFill/>
+        </p:spPr>
+        <p:txBody>
+          <a:bodyPr wrap="none" rtlCol="0">
+            <a:spAutoFit/>
+          </a:bodyPr>
+          <a:lstStyle/>
+          <a:p>
+            <a:r>
+              <a:rPr lang="en-US" sz="3201" b="1"/>
+              <a:t>Parameters space</a:t>
+            </a:r>
+            <a:endParaRPr lang="en-US" sz="3201" b="1" dirty="0"/>
+          </a:p>
+        </p:txBody>
+      </p:sp>
+      <p:sp>
+        <p:nvSpPr>
+          <p:cNvPr id="105" name="TextBox 104"/>
+          <p:cNvSpPr txBox="1"/>
+          <p:nvPr/>
+        </p:nvSpPr>
+        <p:spPr>
+          <a:xfrm>
+            <a:off x="7579738" y="5266242"/>
+            <a:ext cx="4714149" cy="1170192"/>
           </a:xfrm>
           <a:prstGeom prst="rect">
             <a:avLst/>
@@ -5378,791 +5495,50 @@
           </a:ln>
         </p:spPr>
         <p:txBody>
-          <a:bodyPr wrap="none" rtlCol="0">
+          <a:bodyPr wrap="square" rtlCol="0">
             <a:spAutoFit/>
           </a:bodyPr>
           <a:lstStyle/>
           <a:p>
             <a:pPr algn="just"/>
             <a:r>
-              <a:rPr lang="en-US" sz="1401" dirty="0"/>
-              <a:t>1: Target is in a Non-D environment</a:t>
-            </a:r>
-          </a:p>
-          <a:p>
-            <a:pPr algn="just"/>
-            <a:r>
-              <a:rPr lang="en-US" sz="1401" dirty="0"/>
-              <a:t>2: Target is in a D environment</a:t>
-            </a:r>
-          </a:p>
-          <a:p>
-            <a:pPr algn="just"/>
-            <a:r>
-              <a:rPr lang="en-US" sz="1401" dirty="0"/>
-              <a:t>3: Source is in a  D environment</a:t>
-            </a:r>
-          </a:p>
-          <a:p>
-            <a:pPr algn="just"/>
-            <a:r>
-              <a:rPr lang="en-US" sz="1401" dirty="0"/>
-              <a:t>4: Source is in a  Non-D environment</a:t>
-            </a:r>
-          </a:p>
-          <a:p>
-            <a:pPr algn="just"/>
-            <a:r>
-              <a:rPr lang="en-US" sz="1401" dirty="0"/>
-              <a:t>5:Closer areas to domestication origin</a:t>
-            </a:r>
-          </a:p>
-        </p:txBody>
-      </p:sp>
-      <p:sp>
-        <p:nvSpPr>
-          <p:cNvPr id="99" name="Rectangle 98"/>
-          <p:cNvSpPr/>
-          <p:nvPr/>
-        </p:nvSpPr>
-        <p:spPr>
-          <a:xfrm>
-            <a:off x="2157346" y="5083011"/>
-            <a:ext cx="276038" cy="307905"/>
-          </a:xfrm>
-          <a:prstGeom prst="rect">
-            <a:avLst/>
-          </a:prstGeom>
-        </p:spPr>
-        <p:txBody>
-          <a:bodyPr wrap="none">
-            <a:spAutoFit/>
-          </a:bodyPr>
-          <a:lstStyle/>
-          <a:p>
-            <a:r>
-              <a:rPr lang="en-US" sz="1401" dirty="0"/>
-              <a:t>1</a:t>
-            </a:r>
-            <a:endParaRPr lang="en-US" dirty="0"/>
-          </a:p>
-        </p:txBody>
-      </p:sp>
-      <p:sp>
-        <p:nvSpPr>
-          <p:cNvPr id="129" name="TextBox 128"/>
+              <a:rPr lang="en-US" sz="1401" dirty="0" smtClean="0"/>
+              <a:t>Note2: For now we are not interested in maximizing the parameters of </a:t>
+            </a:r>
+            <a:r>
+              <a:rPr lang="en-US" sz="1401" b="1" dirty="0" err="1" smtClean="0"/>
+              <a:t>Arisal</a:t>
+            </a:r>
+            <a:r>
+              <a:rPr lang="en-US" sz="1401" dirty="0" smtClean="0"/>
+              <a:t>. So, it’s value is a random number </a:t>
+            </a:r>
+            <a:r>
+              <a:rPr lang="en-US" sz="1401" dirty="0" smtClean="0"/>
+              <a:t>taken from a </a:t>
+            </a:r>
+            <a:r>
+              <a:rPr lang="en-US" sz="1401" dirty="0" smtClean="0"/>
+              <a:t>decay distribution that approximate better with current estimations of number of independent origins. </a:t>
+            </a:r>
+            <a:r>
+              <a:rPr lang="en-US" sz="1401" dirty="0" smtClean="0"/>
+              <a:t>Also, for now the Location factor is set to 1.</a:t>
+            </a:r>
+            <a:endParaRPr lang="en-US" sz="1401" dirty="0" smtClean="0"/>
+          </a:p>
+        </p:txBody>
+      </p:sp>
+      <p:sp>
+        <p:nvSpPr>
+          <p:cNvPr id="106" name="TextBox 105"/>
           <p:cNvSpPr txBox="1"/>
           <p:nvPr/>
         </p:nvSpPr>
         <p:spPr>
           <a:xfrm>
-            <a:off x="2686608" y="4359418"/>
-            <a:ext cx="309700" cy="584904"/>
-          </a:xfrm>
-          <a:prstGeom prst="rect">
-            <a:avLst/>
-          </a:prstGeom>
-          <a:noFill/>
-        </p:spPr>
-        <p:txBody>
-          <a:bodyPr wrap="none" rtlCol="0">
-            <a:spAutoFit/>
-          </a:bodyPr>
-          <a:lstStyle/>
-          <a:p>
-            <a:r>
-              <a:rPr lang="en-US" sz="3201" dirty="0"/>
-              <a:t>-</a:t>
-            </a:r>
-            <a:endParaRPr lang="en-US" sz="2000" dirty="0"/>
-          </a:p>
-        </p:txBody>
-      </p:sp>
-      <p:cxnSp>
-        <p:nvCxnSpPr>
-          <p:cNvPr id="130" name="Straight Connector 129"/>
-          <p:cNvCxnSpPr/>
-          <p:nvPr/>
-        </p:nvCxnSpPr>
-        <p:spPr>
-          <a:xfrm>
-            <a:off x="2340701" y="4449720"/>
-            <a:ext cx="703247" cy="700053"/>
-          </a:xfrm>
-          <a:prstGeom prst="line">
-            <a:avLst/>
-          </a:prstGeom>
-          <a:ln>
-            <a:solidFill>
-              <a:schemeClr val="tx1"/>
-            </a:solidFill>
-            <a:prstDash val="dashDot"/>
-          </a:ln>
-        </p:spPr>
-        <p:style>
-          <a:lnRef idx="1">
-            <a:schemeClr val="accent1"/>
-          </a:lnRef>
-          <a:fillRef idx="0">
-            <a:schemeClr val="accent1"/>
-          </a:fillRef>
-          <a:effectRef idx="0">
-            <a:schemeClr val="accent1"/>
-          </a:effectRef>
-          <a:fontRef idx="minor">
-            <a:schemeClr val="tx1"/>
-          </a:fontRef>
-        </p:style>
-      </p:cxnSp>
-      <p:sp>
-        <p:nvSpPr>
-          <p:cNvPr id="131" name="Rectangle 130"/>
-          <p:cNvSpPr/>
-          <p:nvPr/>
-        </p:nvSpPr>
-        <p:spPr>
-          <a:xfrm>
-            <a:off x="2855296" y="4376221"/>
-            <a:ext cx="276038" cy="307905"/>
-          </a:xfrm>
-          <a:prstGeom prst="rect">
-            <a:avLst/>
-          </a:prstGeom>
-        </p:spPr>
-        <p:txBody>
-          <a:bodyPr wrap="none">
-            <a:spAutoFit/>
-          </a:bodyPr>
-          <a:lstStyle/>
-          <a:p>
-            <a:r>
-              <a:rPr lang="en-US" sz="1401" dirty="0"/>
-              <a:t>2</a:t>
-            </a:r>
-            <a:endParaRPr lang="en-US" dirty="0"/>
-          </a:p>
-        </p:txBody>
-      </p:sp>
-      <p:sp>
-        <p:nvSpPr>
-          <p:cNvPr id="137" name="TextBox 136"/>
-          <p:cNvSpPr txBox="1"/>
-          <p:nvPr/>
-        </p:nvSpPr>
-        <p:spPr>
-          <a:xfrm>
-            <a:off x="4672057" y="5117708"/>
-            <a:ext cx="338554" cy="461793"/>
-          </a:xfrm>
-          <a:prstGeom prst="rect">
-            <a:avLst/>
-          </a:prstGeom>
-          <a:noFill/>
-        </p:spPr>
-        <p:txBody>
-          <a:bodyPr wrap="none" rtlCol="0">
-            <a:spAutoFit/>
-          </a:bodyPr>
-          <a:lstStyle/>
-          <a:p>
-            <a:r>
-              <a:rPr lang="en-US" sz="2401" dirty="0"/>
-              <a:t>+</a:t>
-            </a:r>
-            <a:endParaRPr lang="en-US" sz="1600" dirty="0"/>
-          </a:p>
-        </p:txBody>
-      </p:sp>
-      <p:cxnSp>
-        <p:nvCxnSpPr>
-          <p:cNvPr id="138" name="Straight Connector 137"/>
-          <p:cNvCxnSpPr/>
-          <p:nvPr/>
-        </p:nvCxnSpPr>
-        <p:spPr>
-          <a:xfrm>
-            <a:off x="4326152" y="5129666"/>
-            <a:ext cx="703247" cy="700053"/>
-          </a:xfrm>
-          <a:prstGeom prst="line">
-            <a:avLst/>
-          </a:prstGeom>
-          <a:ln>
-            <a:solidFill>
-              <a:schemeClr val="tx1"/>
-            </a:solidFill>
-            <a:prstDash val="dashDot"/>
-          </a:ln>
-        </p:spPr>
-        <p:style>
-          <a:lnRef idx="1">
-            <a:schemeClr val="accent1"/>
-          </a:lnRef>
-          <a:fillRef idx="0">
-            <a:schemeClr val="accent1"/>
-          </a:fillRef>
-          <a:effectRef idx="0">
-            <a:schemeClr val="accent1"/>
-          </a:effectRef>
-          <a:fontRef idx="minor">
-            <a:schemeClr val="tx1"/>
-          </a:fontRef>
-        </p:style>
-      </p:cxnSp>
-      <p:sp>
-        <p:nvSpPr>
-          <p:cNvPr id="139" name="Rectangle 138"/>
-          <p:cNvSpPr/>
-          <p:nvPr/>
-        </p:nvSpPr>
-        <p:spPr>
-          <a:xfrm>
-            <a:off x="4840745" y="5070342"/>
-            <a:ext cx="276038" cy="307905"/>
-          </a:xfrm>
-          <a:prstGeom prst="rect">
-            <a:avLst/>
-          </a:prstGeom>
-        </p:spPr>
-        <p:txBody>
-          <a:bodyPr wrap="none">
-            <a:spAutoFit/>
-          </a:bodyPr>
-          <a:lstStyle/>
-          <a:p>
-            <a:r>
-              <a:rPr lang="en-US" sz="1401" dirty="0"/>
-              <a:t>3</a:t>
-            </a:r>
-            <a:endParaRPr lang="en-US" dirty="0"/>
-          </a:p>
-        </p:txBody>
-      </p:sp>
-      <p:cxnSp>
-        <p:nvCxnSpPr>
-          <p:cNvPr id="142" name="Straight Connector 141"/>
-          <p:cNvCxnSpPr/>
-          <p:nvPr/>
-        </p:nvCxnSpPr>
-        <p:spPr>
-          <a:xfrm>
-            <a:off x="5027773" y="4433013"/>
-            <a:ext cx="703247" cy="700053"/>
-          </a:xfrm>
-          <a:prstGeom prst="line">
-            <a:avLst/>
-          </a:prstGeom>
-          <a:ln>
-            <a:solidFill>
-              <a:schemeClr val="tx1"/>
-            </a:solidFill>
-            <a:prstDash val="dashDot"/>
-          </a:ln>
-        </p:spPr>
-        <p:style>
-          <a:lnRef idx="1">
-            <a:schemeClr val="accent1"/>
-          </a:lnRef>
-          <a:fillRef idx="0">
-            <a:schemeClr val="accent1"/>
-          </a:fillRef>
-          <a:effectRef idx="0">
-            <a:schemeClr val="accent1"/>
-          </a:effectRef>
-          <a:fontRef idx="minor">
-            <a:schemeClr val="tx1"/>
-          </a:fontRef>
-        </p:style>
-      </p:cxnSp>
-      <p:sp>
-        <p:nvSpPr>
-          <p:cNvPr id="143" name="Rectangle 142"/>
-          <p:cNvSpPr/>
-          <p:nvPr/>
-        </p:nvSpPr>
-        <p:spPr>
-          <a:xfrm>
-            <a:off x="5521104" y="4366602"/>
-            <a:ext cx="276038" cy="307905"/>
-          </a:xfrm>
-          <a:prstGeom prst="rect">
-            <a:avLst/>
-          </a:prstGeom>
-        </p:spPr>
-        <p:txBody>
-          <a:bodyPr wrap="none">
-            <a:spAutoFit/>
-          </a:bodyPr>
-          <a:lstStyle/>
-          <a:p>
-            <a:r>
-              <a:rPr lang="en-US" sz="1401" dirty="0"/>
-              <a:t>2</a:t>
-            </a:r>
-            <a:endParaRPr lang="en-US" dirty="0"/>
-          </a:p>
-        </p:txBody>
-      </p:sp>
-      <p:sp>
-        <p:nvSpPr>
-          <p:cNvPr id="146" name="Rectangle 145"/>
-          <p:cNvSpPr/>
-          <p:nvPr/>
-        </p:nvSpPr>
-        <p:spPr>
-          <a:xfrm>
-            <a:off x="5004868" y="5078299"/>
-            <a:ext cx="415498" cy="307905"/>
-          </a:xfrm>
-          <a:prstGeom prst="rect">
-            <a:avLst/>
-          </a:prstGeom>
-        </p:spPr>
-        <p:txBody>
-          <a:bodyPr wrap="none">
-            <a:spAutoFit/>
-          </a:bodyPr>
-          <a:lstStyle/>
-          <a:p>
-            <a:r>
-              <a:rPr lang="en-US" sz="1401" dirty="0" smtClean="0"/>
-              <a:t>1:</a:t>
-            </a:r>
-            <a:r>
-              <a:rPr lang="en-US" sz="1400" dirty="0" smtClean="0"/>
-              <a:t>3</a:t>
-            </a:r>
-            <a:endParaRPr lang="en-US" dirty="0"/>
-          </a:p>
-        </p:txBody>
-      </p:sp>
-      <p:sp>
-        <p:nvSpPr>
-          <p:cNvPr id="153" name="Rectangle 152"/>
-          <p:cNvSpPr/>
-          <p:nvPr/>
-        </p:nvSpPr>
-        <p:spPr>
-          <a:xfrm>
-            <a:off x="5018491" y="5478619"/>
-            <a:ext cx="415498" cy="307905"/>
-          </a:xfrm>
-          <a:prstGeom prst="rect">
-            <a:avLst/>
-          </a:prstGeom>
-        </p:spPr>
-        <p:txBody>
-          <a:bodyPr wrap="none">
-            <a:spAutoFit/>
-          </a:bodyPr>
-          <a:lstStyle/>
-          <a:p>
-            <a:r>
-              <a:rPr lang="en-US" sz="1401" dirty="0"/>
-              <a:t>2:4</a:t>
-            </a:r>
-            <a:endParaRPr lang="en-US" dirty="0"/>
-          </a:p>
-        </p:txBody>
-      </p:sp>
-      <p:cxnSp>
-        <p:nvCxnSpPr>
-          <p:cNvPr id="156" name="Straight Connector 155"/>
-          <p:cNvCxnSpPr/>
-          <p:nvPr/>
-        </p:nvCxnSpPr>
-        <p:spPr>
-          <a:xfrm>
-            <a:off x="5347907" y="5132763"/>
-            <a:ext cx="0" cy="698166"/>
-          </a:xfrm>
-          <a:prstGeom prst="line">
-            <a:avLst/>
-          </a:prstGeom>
-          <a:ln>
-            <a:solidFill>
-              <a:schemeClr val="tx1"/>
-            </a:solidFill>
-          </a:ln>
-        </p:spPr>
-        <p:style>
-          <a:lnRef idx="1">
-            <a:schemeClr val="accent1"/>
-          </a:lnRef>
-          <a:fillRef idx="0">
-            <a:schemeClr val="accent1"/>
-          </a:fillRef>
-          <a:effectRef idx="0">
-            <a:schemeClr val="accent1"/>
-          </a:effectRef>
-          <a:fontRef idx="minor">
-            <a:schemeClr val="tx1"/>
-          </a:fontRef>
-        </p:style>
-      </p:cxnSp>
-      <p:sp>
-        <p:nvSpPr>
-          <p:cNvPr id="163" name="Rectangle 162"/>
-          <p:cNvSpPr/>
-          <p:nvPr/>
-        </p:nvSpPr>
-        <p:spPr>
-          <a:xfrm>
-            <a:off x="7447175" y="2076433"/>
-            <a:ext cx="276038" cy="307905"/>
-          </a:xfrm>
-          <a:prstGeom prst="rect">
-            <a:avLst/>
-          </a:prstGeom>
-        </p:spPr>
-        <p:txBody>
-          <a:bodyPr wrap="none">
-            <a:spAutoFit/>
-          </a:bodyPr>
-          <a:lstStyle/>
-          <a:p>
-            <a:r>
-              <a:rPr lang="en-US" sz="1401" dirty="0"/>
-              <a:t>5</a:t>
-            </a:r>
-            <a:endParaRPr lang="en-US" dirty="0"/>
-          </a:p>
-        </p:txBody>
-      </p:sp>
-      <p:sp>
-        <p:nvSpPr>
-          <p:cNvPr id="164" name="Rectangle 163"/>
-          <p:cNvSpPr/>
-          <p:nvPr/>
-        </p:nvSpPr>
-        <p:spPr>
-          <a:xfrm>
-            <a:off x="8177304" y="2089748"/>
-            <a:ext cx="276038" cy="307905"/>
-          </a:xfrm>
-          <a:prstGeom prst="rect">
-            <a:avLst/>
-          </a:prstGeom>
-        </p:spPr>
-        <p:txBody>
-          <a:bodyPr wrap="none">
-            <a:spAutoFit/>
-          </a:bodyPr>
-          <a:lstStyle/>
-          <a:p>
-            <a:r>
-              <a:rPr lang="en-US" sz="1401"/>
-              <a:t>5</a:t>
-            </a:r>
-            <a:endParaRPr lang="en-US" dirty="0"/>
-          </a:p>
-        </p:txBody>
-      </p:sp>
-      <p:sp>
-        <p:nvSpPr>
-          <p:cNvPr id="165" name="TextBox 164"/>
-          <p:cNvSpPr txBox="1"/>
-          <p:nvPr/>
-        </p:nvSpPr>
-        <p:spPr>
-          <a:xfrm>
-            <a:off x="9510920" y="4274888"/>
-            <a:ext cx="1080745" cy="400110"/>
-          </a:xfrm>
-          <a:prstGeom prst="rect">
-            <a:avLst/>
-          </a:prstGeom>
-          <a:noFill/>
-        </p:spPr>
-        <p:txBody>
-          <a:bodyPr wrap="none" rtlCol="0">
-            <a:spAutoFit/>
-          </a:bodyPr>
-          <a:lstStyle/>
-          <a:p>
-            <a:r>
-              <a:rPr lang="en-US" sz="2000" dirty="0"/>
-              <a:t>+ {p</a:t>
-            </a:r>
-            <a:r>
-              <a:rPr lang="en-US" sz="2000" baseline="-25000" dirty="0"/>
-              <a:t>i</a:t>
-            </a:r>
-            <a:r>
-              <a:rPr lang="en-US" sz="2000" dirty="0"/>
-              <a:t> * X}</a:t>
-            </a:r>
-            <a:endParaRPr lang="en-US" sz="1401" dirty="0"/>
-          </a:p>
-        </p:txBody>
-      </p:sp>
-      <p:sp>
-        <p:nvSpPr>
-          <p:cNvPr id="166" name="TextBox 165"/>
-          <p:cNvSpPr txBox="1"/>
-          <p:nvPr/>
-        </p:nvSpPr>
-        <p:spPr>
-          <a:xfrm>
-            <a:off x="9523289" y="4612652"/>
-            <a:ext cx="1048685" cy="584904"/>
-          </a:xfrm>
-          <a:prstGeom prst="rect">
-            <a:avLst/>
-          </a:prstGeom>
-          <a:noFill/>
-        </p:spPr>
-        <p:txBody>
-          <a:bodyPr wrap="none" rtlCol="0">
-            <a:spAutoFit/>
-          </a:bodyPr>
-          <a:lstStyle/>
-          <a:p>
-            <a:r>
-              <a:rPr lang="en-US" sz="3201" dirty="0"/>
-              <a:t>-</a:t>
-            </a:r>
-            <a:r>
-              <a:rPr lang="en-US" sz="2000" dirty="0"/>
-              <a:t> {p</a:t>
-            </a:r>
-            <a:r>
-              <a:rPr lang="en-US" sz="2000" baseline="-25000" dirty="0"/>
-              <a:t>i</a:t>
-            </a:r>
-            <a:r>
-              <a:rPr lang="en-US" sz="2000" dirty="0"/>
-              <a:t> / X}</a:t>
-            </a:r>
-            <a:endParaRPr lang="en-US" sz="1401" dirty="0"/>
-          </a:p>
-        </p:txBody>
-      </p:sp>
-      <p:sp>
-        <p:nvSpPr>
-          <p:cNvPr id="169" name="TextBox 168"/>
-          <p:cNvSpPr txBox="1"/>
-          <p:nvPr/>
-        </p:nvSpPr>
-        <p:spPr>
-          <a:xfrm>
-            <a:off x="10761264" y="4510226"/>
-            <a:ext cx="1959896" cy="707886"/>
-          </a:xfrm>
-          <a:prstGeom prst="rect">
-            <a:avLst/>
-          </a:prstGeom>
-          <a:noFill/>
-        </p:spPr>
-        <p:txBody>
-          <a:bodyPr wrap="none" rtlCol="0">
-            <a:spAutoFit/>
-          </a:bodyPr>
-          <a:lstStyle/>
-          <a:p>
-            <a:r>
-              <a:rPr lang="en-US" sz="2000" dirty="0"/>
-              <a:t>X </a:t>
-            </a:r>
-            <a:r>
-              <a:rPr lang="en-US" sz="2000"/>
-              <a:t>= environment </a:t>
-            </a:r>
-          </a:p>
-          <a:p>
-            <a:pPr algn="ctr"/>
-            <a:r>
-              <a:rPr lang="en-US" sz="2000" dirty="0"/>
-              <a:t>factor</a:t>
-            </a:r>
-            <a:endParaRPr lang="en-US" sz="1401" dirty="0"/>
-          </a:p>
-        </p:txBody>
-      </p:sp>
-      <p:sp>
-        <p:nvSpPr>
-          <p:cNvPr id="170" name="TextBox 169"/>
-          <p:cNvSpPr txBox="1"/>
-          <p:nvPr/>
-        </p:nvSpPr>
-        <p:spPr>
-          <a:xfrm>
-            <a:off x="7958720" y="2170885"/>
-            <a:ext cx="494623" cy="461793"/>
-          </a:xfrm>
-          <a:prstGeom prst="rect">
-            <a:avLst/>
-          </a:prstGeom>
-          <a:noFill/>
-        </p:spPr>
-        <p:txBody>
-          <a:bodyPr wrap="none" rtlCol="0">
-            <a:spAutoFit/>
-          </a:bodyPr>
-          <a:lstStyle/>
-          <a:p>
-            <a:r>
-              <a:rPr lang="en-US" sz="2401" dirty="0"/>
-              <a:t>++</a:t>
-            </a:r>
-            <a:endParaRPr lang="en-US" sz="1600" dirty="0"/>
-          </a:p>
-        </p:txBody>
-      </p:sp>
-      <p:sp>
-        <p:nvSpPr>
-          <p:cNvPr id="171" name="TextBox 170"/>
-          <p:cNvSpPr txBox="1"/>
-          <p:nvPr/>
-        </p:nvSpPr>
-        <p:spPr>
-          <a:xfrm>
-            <a:off x="7296324" y="2162479"/>
-            <a:ext cx="494623" cy="461793"/>
-          </a:xfrm>
-          <a:prstGeom prst="rect">
-            <a:avLst/>
-          </a:prstGeom>
-          <a:noFill/>
-        </p:spPr>
-        <p:txBody>
-          <a:bodyPr wrap="none" rtlCol="0">
-            <a:spAutoFit/>
-          </a:bodyPr>
-          <a:lstStyle/>
-          <a:p>
-            <a:r>
-              <a:rPr lang="en-US" sz="2401" dirty="0"/>
-              <a:t>++</a:t>
-            </a:r>
-            <a:endParaRPr lang="en-US" sz="1600" dirty="0"/>
-          </a:p>
-        </p:txBody>
-      </p:sp>
-      <p:sp>
-        <p:nvSpPr>
-          <p:cNvPr id="172" name="TextBox 171"/>
-          <p:cNvSpPr txBox="1"/>
-          <p:nvPr/>
-        </p:nvSpPr>
-        <p:spPr>
-          <a:xfrm>
-            <a:off x="9940725" y="1455004"/>
-            <a:ext cx="1223605" cy="400110"/>
-          </a:xfrm>
-          <a:prstGeom prst="rect">
-            <a:avLst/>
-          </a:prstGeom>
-          <a:noFill/>
-        </p:spPr>
-        <p:txBody>
-          <a:bodyPr wrap="none" rtlCol="0">
-            <a:spAutoFit/>
-          </a:bodyPr>
-          <a:lstStyle/>
-          <a:p>
-            <a:r>
-              <a:rPr lang="en-US" sz="2000" dirty="0"/>
-              <a:t>++ {p</a:t>
-            </a:r>
-            <a:r>
-              <a:rPr lang="en-US" sz="2000" baseline="-25000" dirty="0"/>
-              <a:t>i</a:t>
-            </a:r>
-            <a:r>
-              <a:rPr lang="en-US" sz="2000" dirty="0"/>
-              <a:t> * L</a:t>
-            </a:r>
-            <a:r>
-              <a:rPr lang="en-US" sz="2000" baseline="-25000" dirty="0"/>
-              <a:t>i</a:t>
-            </a:r>
-            <a:r>
-              <a:rPr lang="en-US" sz="2000" dirty="0"/>
-              <a:t>}</a:t>
-            </a:r>
-            <a:endParaRPr lang="en-US" sz="1401" dirty="0"/>
-          </a:p>
-        </p:txBody>
-      </p:sp>
-      <p:sp>
-        <p:nvSpPr>
-          <p:cNvPr id="173" name="TextBox 172"/>
-          <p:cNvSpPr txBox="1"/>
-          <p:nvPr/>
-        </p:nvSpPr>
-        <p:spPr>
-          <a:xfrm>
-            <a:off x="9783550" y="1941232"/>
-            <a:ext cx="2131994" cy="400110"/>
-          </a:xfrm>
-          <a:prstGeom prst="rect">
-            <a:avLst/>
-          </a:prstGeom>
-          <a:noFill/>
-        </p:spPr>
-        <p:txBody>
-          <a:bodyPr wrap="none" rtlCol="0">
-            <a:spAutoFit/>
-          </a:bodyPr>
-          <a:lstStyle/>
-          <a:p>
-            <a:r>
-              <a:rPr lang="en-US" sz="2000" dirty="0"/>
-              <a:t>L</a:t>
-            </a:r>
-            <a:r>
-              <a:rPr lang="en-US" sz="2000" baseline="-25000" dirty="0" smtClean="0"/>
-              <a:t>i</a:t>
-            </a:r>
-            <a:r>
-              <a:rPr lang="en-US" sz="2000" dirty="0"/>
-              <a:t> = Location factor</a:t>
-            </a:r>
-            <a:endParaRPr lang="en-US" sz="1401" dirty="0"/>
-          </a:p>
-        </p:txBody>
-      </p:sp>
-      <p:sp>
-        <p:nvSpPr>
-          <p:cNvPr id="174" name="TextBox 173"/>
-          <p:cNvSpPr txBox="1"/>
-          <p:nvPr/>
-        </p:nvSpPr>
-        <p:spPr>
-          <a:xfrm>
-            <a:off x="3556262" y="69158"/>
-            <a:ext cx="3179204" cy="584904"/>
-          </a:xfrm>
-          <a:prstGeom prst="rect">
-            <a:avLst/>
-          </a:prstGeom>
-          <a:noFill/>
-        </p:spPr>
-        <p:txBody>
-          <a:bodyPr wrap="none" rtlCol="0">
-            <a:spAutoFit/>
-          </a:bodyPr>
-          <a:lstStyle/>
-          <a:p>
-            <a:r>
-              <a:rPr lang="en-US" sz="3201" b="1"/>
-              <a:t>Parameters space</a:t>
-            </a:r>
-            <a:endParaRPr lang="en-US" sz="3201" b="1" dirty="0"/>
-          </a:p>
-        </p:txBody>
-      </p:sp>
-      <p:sp>
-        <p:nvSpPr>
-          <p:cNvPr id="178" name="Rectangle 177"/>
-          <p:cNvSpPr/>
-          <p:nvPr/>
-        </p:nvSpPr>
-        <p:spPr>
-          <a:xfrm>
-            <a:off x="7068371" y="4427991"/>
-            <a:ext cx="1402938" cy="1402938"/>
+            <a:off x="7583650" y="4368630"/>
+            <a:ext cx="4714149" cy="739048"/>
           </a:xfrm>
           <a:prstGeom prst="rect">
             <a:avLst/>
@@ -6174,307 +5550,6 @@
             </a:solidFill>
           </a:ln>
         </p:spPr>
-        <p:style>
-          <a:lnRef idx="2">
-            <a:schemeClr val="accent6"/>
-          </a:lnRef>
-          <a:fillRef idx="1">
-            <a:schemeClr val="lt1"/>
-          </a:fillRef>
-          <a:effectRef idx="0">
-            <a:schemeClr val="accent6"/>
-          </a:effectRef>
-          <a:fontRef idx="minor">
-            <a:schemeClr val="dk1"/>
-          </a:fontRef>
-        </p:style>
-        <p:txBody>
-          <a:bodyPr rot="0" spcFirstLastPara="0" vertOverflow="overflow" horzOverflow="overflow" vert="horz" wrap="square" lIns="91440" tIns="45720" rIns="91440" bIns="45720" numCol="1" spcCol="0" rtlCol="0" fromWordArt="0" anchor="ctr" anchorCtr="0" forceAA="0" compatLnSpc="1">
-            <a:prstTxWarp prst="textNoShape">
-              <a:avLst/>
-            </a:prstTxWarp>
-            <a:noAutofit/>
-          </a:bodyPr>
-          <a:lstStyle/>
-          <a:p>
-            <a:pPr algn="ctr"/>
-            <a:endParaRPr lang="en-US" b="1"/>
-          </a:p>
-        </p:txBody>
-      </p:sp>
-      <p:sp>
-        <p:nvSpPr>
-          <p:cNvPr id="182" name="TextBox 181"/>
-          <p:cNvSpPr txBox="1"/>
-          <p:nvPr/>
-        </p:nvSpPr>
-        <p:spPr>
-          <a:xfrm>
-            <a:off x="6571504" y="4018139"/>
-            <a:ext cx="2511393" cy="338554"/>
-          </a:xfrm>
-          <a:prstGeom prst="rect">
-            <a:avLst/>
-          </a:prstGeom>
-          <a:noFill/>
-        </p:spPr>
-        <p:txBody>
-          <a:bodyPr wrap="none" rtlCol="0">
-            <a:spAutoFit/>
-          </a:bodyPr>
-          <a:lstStyle/>
-          <a:p>
-            <a:r>
-              <a:rPr lang="en-US" sz="1600" i="1" dirty="0"/>
-              <a:t>Probability of Takeover (</a:t>
-            </a:r>
-            <a:r>
-              <a:rPr lang="en-US" sz="1600" i="1" dirty="0" err="1"/>
-              <a:t>ind</a:t>
-            </a:r>
-            <a:r>
-              <a:rPr lang="en-US" sz="1600" i="1" dirty="0"/>
-              <a:t>)</a:t>
-            </a:r>
-          </a:p>
-        </p:txBody>
-      </p:sp>
-      <p:sp>
-        <p:nvSpPr>
-          <p:cNvPr id="183" name="TextBox 182"/>
-          <p:cNvSpPr txBox="1"/>
-          <p:nvPr/>
-        </p:nvSpPr>
-        <p:spPr>
-          <a:xfrm>
-            <a:off x="6701486" y="4569431"/>
-            <a:ext cx="290464" cy="369332"/>
-          </a:xfrm>
-          <a:prstGeom prst="rect">
-            <a:avLst/>
-          </a:prstGeom>
-          <a:noFill/>
-        </p:spPr>
-        <p:txBody>
-          <a:bodyPr wrap="none" rtlCol="0">
-            <a:spAutoFit/>
-          </a:bodyPr>
-          <a:lstStyle/>
-          <a:p>
-            <a:r>
-              <a:rPr lang="en-US"/>
-              <a:t>F</a:t>
-            </a:r>
-            <a:endParaRPr lang="en-US" dirty="0"/>
-          </a:p>
-        </p:txBody>
-      </p:sp>
-      <p:sp>
-        <p:nvSpPr>
-          <p:cNvPr id="184" name="TextBox 183"/>
-          <p:cNvSpPr txBox="1"/>
-          <p:nvPr/>
-        </p:nvSpPr>
-        <p:spPr>
-          <a:xfrm>
-            <a:off x="7272222" y="5922176"/>
-            <a:ext cx="290464" cy="369332"/>
-          </a:xfrm>
-          <a:prstGeom prst="rect">
-            <a:avLst/>
-          </a:prstGeom>
-          <a:noFill/>
-        </p:spPr>
-        <p:txBody>
-          <a:bodyPr wrap="none" rtlCol="0">
-            <a:spAutoFit/>
-          </a:bodyPr>
-          <a:lstStyle/>
-          <a:p>
-            <a:r>
-              <a:rPr lang="en-US"/>
-              <a:t>F</a:t>
-            </a:r>
-            <a:endParaRPr lang="en-US" dirty="0"/>
-          </a:p>
-        </p:txBody>
-      </p:sp>
-      <p:sp>
-        <p:nvSpPr>
-          <p:cNvPr id="185" name="TextBox 184"/>
-          <p:cNvSpPr txBox="1"/>
-          <p:nvPr/>
-        </p:nvSpPr>
-        <p:spPr>
-          <a:xfrm>
-            <a:off x="6676293" y="5356267"/>
-            <a:ext cx="327334" cy="369332"/>
-          </a:xfrm>
-          <a:prstGeom prst="rect">
-            <a:avLst/>
-          </a:prstGeom>
-          <a:noFill/>
-        </p:spPr>
-        <p:txBody>
-          <a:bodyPr wrap="none" rtlCol="0">
-            <a:spAutoFit/>
-          </a:bodyPr>
-          <a:lstStyle/>
-          <a:p>
-            <a:r>
-              <a:rPr lang="en-US"/>
-              <a:t>D</a:t>
-            </a:r>
-            <a:endParaRPr lang="en-US" dirty="0"/>
-          </a:p>
-        </p:txBody>
-      </p:sp>
-      <p:sp>
-        <p:nvSpPr>
-          <p:cNvPr id="186" name="TextBox 185"/>
-          <p:cNvSpPr txBox="1"/>
-          <p:nvPr/>
-        </p:nvSpPr>
-        <p:spPr>
-          <a:xfrm>
-            <a:off x="8007732" y="5914545"/>
-            <a:ext cx="327334" cy="369332"/>
-          </a:xfrm>
-          <a:prstGeom prst="rect">
-            <a:avLst/>
-          </a:prstGeom>
-          <a:noFill/>
-        </p:spPr>
-        <p:txBody>
-          <a:bodyPr wrap="none" rtlCol="0">
-            <a:spAutoFit/>
-          </a:bodyPr>
-          <a:lstStyle/>
-          <a:p>
-            <a:r>
-              <a:rPr lang="en-US"/>
-              <a:t>D</a:t>
-            </a:r>
-            <a:endParaRPr lang="en-US" dirty="0"/>
-          </a:p>
-        </p:txBody>
-      </p:sp>
-      <p:sp>
-        <p:nvSpPr>
-          <p:cNvPr id="188" name="TextBox 187"/>
-          <p:cNvSpPr txBox="1"/>
-          <p:nvPr/>
-        </p:nvSpPr>
-        <p:spPr>
-          <a:xfrm>
-            <a:off x="7063292" y="6261340"/>
-            <a:ext cx="1498167" cy="369332"/>
-          </a:xfrm>
-          <a:prstGeom prst="rect">
-            <a:avLst/>
-          </a:prstGeom>
-          <a:noFill/>
-        </p:spPr>
-        <p:txBody>
-          <a:bodyPr wrap="none" rtlCol="0">
-            <a:spAutoFit/>
-          </a:bodyPr>
-          <a:lstStyle/>
-          <a:p>
-            <a:r>
-              <a:rPr lang="en-US" b="1" dirty="0"/>
-              <a:t>Target society</a:t>
-            </a:r>
-          </a:p>
-        </p:txBody>
-      </p:sp>
-      <p:cxnSp>
-        <p:nvCxnSpPr>
-          <p:cNvPr id="206" name="Straight Arrow Connector 205"/>
-          <p:cNvCxnSpPr/>
-          <p:nvPr/>
-        </p:nvCxnSpPr>
-        <p:spPr>
-          <a:xfrm flipV="1">
-            <a:off x="5937160" y="5140098"/>
-            <a:ext cx="648387" cy="7425"/>
-          </a:xfrm>
-          <a:prstGeom prst="straightConnector1">
-            <a:avLst/>
-          </a:prstGeom>
-          <a:ln>
-            <a:solidFill>
-              <a:schemeClr val="tx1"/>
-            </a:solidFill>
-            <a:headEnd type="triangle"/>
-            <a:tailEnd type="triangle"/>
-          </a:ln>
-        </p:spPr>
-        <p:style>
-          <a:lnRef idx="1">
-            <a:schemeClr val="accent1"/>
-          </a:lnRef>
-          <a:fillRef idx="0">
-            <a:schemeClr val="accent1"/>
-          </a:fillRef>
-          <a:effectRef idx="0">
-            <a:schemeClr val="accent1"/>
-          </a:effectRef>
-          <a:fontRef idx="minor">
-            <a:schemeClr val="tx1"/>
-          </a:fontRef>
-        </p:style>
-      </p:cxnSp>
-      <p:sp>
-        <p:nvSpPr>
-          <p:cNvPr id="208" name="TextBox 207"/>
-          <p:cNvSpPr txBox="1"/>
-          <p:nvPr/>
-        </p:nvSpPr>
-        <p:spPr>
-          <a:xfrm>
-            <a:off x="5869071" y="4731151"/>
-            <a:ext cx="795411" cy="338554"/>
-          </a:xfrm>
-          <a:prstGeom prst="rect">
-            <a:avLst/>
-          </a:prstGeom>
-          <a:noFill/>
-        </p:spPr>
-        <p:txBody>
-          <a:bodyPr wrap="none" rtlCol="0">
-            <a:spAutoFit/>
-          </a:bodyPr>
-          <a:lstStyle/>
-          <a:p>
-            <a:r>
-              <a:rPr lang="en-US" sz="1600" dirty="0" err="1"/>
-              <a:t>rnd</a:t>
-            </a:r>
-            <a:r>
-              <a:rPr lang="en-US" sz="1600" dirty="0"/>
-              <a:t> &lt; H</a:t>
-            </a:r>
-            <a:endParaRPr lang="en-US" sz="1100" dirty="0"/>
-          </a:p>
-        </p:txBody>
-      </p:sp>
-      <p:sp>
-        <p:nvSpPr>
-          <p:cNvPr id="209" name="TextBox 208"/>
-          <p:cNvSpPr txBox="1"/>
-          <p:nvPr/>
-        </p:nvSpPr>
-        <p:spPr>
-          <a:xfrm>
-            <a:off x="9530798" y="2694987"/>
-            <a:ext cx="2760512" cy="1138773"/>
-          </a:xfrm>
-          <a:prstGeom prst="rect">
-            <a:avLst/>
-          </a:prstGeom>
-          <a:noFill/>
-        </p:spPr>
         <p:txBody>
           <a:bodyPr wrap="square" rtlCol="0">
             <a:spAutoFit/>
@@ -6483,52 +5558,12 @@
           <a:p>
             <a:pPr algn="just"/>
             <a:r>
-              <a:rPr lang="en-US" sz="2000" dirty="0"/>
-              <a:t>H = </a:t>
-            </a:r>
-            <a:r>
-              <a:rPr lang="en-US" sz="1600" dirty="0"/>
-              <a:t>transition factor from Takeover dependent to Takeover independent of the trait</a:t>
-            </a:r>
-            <a:endParaRPr lang="en-US" sz="2000" dirty="0"/>
-          </a:p>
-        </p:txBody>
-      </p:sp>
-      <p:cxnSp>
-        <p:nvCxnSpPr>
-          <p:cNvPr id="109" name="Straight Connector 108"/>
-          <p:cNvCxnSpPr/>
-          <p:nvPr/>
-        </p:nvCxnSpPr>
-        <p:spPr>
-          <a:xfrm flipH="1">
-            <a:off x="5015939" y="5493491"/>
-            <a:ext cx="331968" cy="0"/>
-          </a:xfrm>
-          <a:prstGeom prst="line">
-            <a:avLst/>
-          </a:prstGeom>
-          <a:ln>
-            <a:solidFill>
-              <a:schemeClr val="tx1"/>
-            </a:solidFill>
-          </a:ln>
-        </p:spPr>
-        <p:style>
-          <a:lnRef idx="1">
-            <a:schemeClr val="accent1"/>
-          </a:lnRef>
-          <a:fillRef idx="0">
-            <a:schemeClr val="accent1"/>
-          </a:fillRef>
-          <a:effectRef idx="0">
-            <a:schemeClr val="accent1"/>
-          </a:effectRef>
-          <a:fontRef idx="minor">
-            <a:schemeClr val="tx1"/>
-          </a:fontRef>
-        </p:style>
-      </p:cxnSp>
+              <a:rPr lang="en-US" sz="1401" dirty="0" smtClean="0"/>
+              <a:t>Note1: Takeover by Domestication only happens if the target is in a suitable location for domestication. The same happens to diffusion.</a:t>
+            </a:r>
+          </a:p>
+        </p:txBody>
+      </p:sp>
     </p:spTree>
     <p:extLst>
       <p:ext uri="{BB962C8B-B14F-4D97-AF65-F5344CB8AC3E}">

</xml_diff>